<commit_message>
Added ExTENCI, SCHIM and RADICAL SOP
</commit_message>
<xml_diff>
--- a/Radical_SC12_Poster.pptx
+++ b/Radical_SC12_Poster.pptx
@@ -1,6 +1,6 @@
 
 <file path=ppt/presentation.xml><?xml version="1.0" encoding="utf-8"?>
-<p:presentation xmlns:a="http://schemas.openxmlformats.org/drawingml/2006/main" xmlns:r="http://schemas.openxmlformats.org/officeDocument/2006/relationships" xmlns:p="http://schemas.openxmlformats.org/presentationml/2006/main" saveSubsetFonts="1">
+<p:presentation xmlns:a="http://schemas.openxmlformats.org/drawingml/2006/main" xmlns:r="http://schemas.openxmlformats.org/officeDocument/2006/relationships" xmlns:mc="http://schemas.openxmlformats.org/markup-compatibility/2006" xmlns:mv="urn:schemas-microsoft-com:mac:vml" xmlns:p="http://schemas.openxmlformats.org/presentationml/2006/main" mc:Ignorable="mv" mc:PreserveAttributes="mv:*" saveSubsetFonts="1">
   <p:sldMasterIdLst>
     <p:sldMasterId id="2147483648" r:id="rId1"/>
   </p:sldMasterIdLst>
@@ -144,7 +144,7 @@
 </file>
 
 <file path=ppt/handoutMasters/handoutMaster1.xml><?xml version="1.0" encoding="utf-8"?>
-<p:handoutMaster xmlns:a="http://schemas.openxmlformats.org/drawingml/2006/main" xmlns:r="http://schemas.openxmlformats.org/officeDocument/2006/relationships" xmlns:p="http://schemas.openxmlformats.org/presentationml/2006/main">
+<p:handoutMaster xmlns:a="http://schemas.openxmlformats.org/drawingml/2006/main" xmlns:r="http://schemas.openxmlformats.org/officeDocument/2006/relationships" xmlns:mc="http://schemas.openxmlformats.org/markup-compatibility/2006" xmlns:mv="urn:schemas-microsoft-com:mac:vml" xmlns:p="http://schemas.openxmlformats.org/presentationml/2006/main" mc:Ignorable="mv" mc:PreserveAttributes="mv:*">
   <p:cSld>
     <p:bg>
       <p:bgRef idx="1001">
@@ -302,7 +302,7 @@
     </p:spTree>
     <p:extLst>
       <p:ext uri="{BB962C8B-B14F-4D97-AF65-F5344CB8AC3E}">
-        <p14:creationId xmlns:p14="http://schemas.microsoft.com/office/powerpoint/2010/main" val="3430505279"/>
+        <p14:creationId xmlns:p14="http://schemas.microsoft.com/office/powerpoint/2010/main" xmlns:p="http://schemas.openxmlformats.org/presentationml/2006/main" xmlns:r="http://schemas.openxmlformats.org/officeDocument/2006/relationships" xmlns:a="http://schemas.openxmlformats.org/drawingml/2006/main" xmlns="" val="3430505279"/>
       </p:ext>
     </p:extLst>
   </p:cSld>
@@ -311,7 +311,7 @@
 </file>
 
 <file path=ppt/notesMasters/notesMaster1.xml><?xml version="1.0" encoding="utf-8"?>
-<p:notesMaster xmlns:a="http://schemas.openxmlformats.org/drawingml/2006/main" xmlns:r="http://schemas.openxmlformats.org/officeDocument/2006/relationships" xmlns:p="http://schemas.openxmlformats.org/presentationml/2006/main">
+<p:notesMaster xmlns:a="http://schemas.openxmlformats.org/drawingml/2006/main" xmlns:r="http://schemas.openxmlformats.org/officeDocument/2006/relationships" xmlns:mc="http://schemas.openxmlformats.org/markup-compatibility/2006" xmlns:mv="urn:schemas-microsoft-com:mac:vml" xmlns:p="http://schemas.openxmlformats.org/presentationml/2006/main" mc:Ignorable="mv" mc:PreserveAttributes="mv:*">
   <p:cSld>
     <p:bg>
       <p:bgRef idx="1001">
@@ -564,7 +564,7 @@
     </p:spTree>
     <p:extLst>
       <p:ext uri="{BB962C8B-B14F-4D97-AF65-F5344CB8AC3E}">
-        <p14:creationId xmlns:p14="http://schemas.microsoft.com/office/powerpoint/2010/main" val="2400819320"/>
+        <p14:creationId xmlns:p14="http://schemas.microsoft.com/office/powerpoint/2010/main" xmlns:p="http://schemas.openxmlformats.org/presentationml/2006/main" xmlns:r="http://schemas.openxmlformats.org/officeDocument/2006/relationships" xmlns:a="http://schemas.openxmlformats.org/drawingml/2006/main" xmlns="" val="2400819320"/>
       </p:ext>
     </p:extLst>
   </p:cSld>
@@ -665,7 +665,7 @@
 </file>
 
 <file path=ppt/slideLayouts/slideLayout1.xml><?xml version="1.0" encoding="utf-8"?>
-<p:sldLayout xmlns:a="http://schemas.openxmlformats.org/drawingml/2006/main" xmlns:r="http://schemas.openxmlformats.org/officeDocument/2006/relationships" xmlns:p="http://schemas.openxmlformats.org/presentationml/2006/main" showMasterSp="0" type="title" preserve="1">
+<p:sldLayout xmlns:a="http://schemas.openxmlformats.org/drawingml/2006/main" xmlns:r="http://schemas.openxmlformats.org/officeDocument/2006/relationships" xmlns:mc="http://schemas.openxmlformats.org/markup-compatibility/2006" xmlns:mv="urn:schemas-microsoft-com:mac:vml" xmlns:p="http://schemas.openxmlformats.org/presentationml/2006/main" mc:Ignorable="mv" mc:PreserveAttributes="mv:*" showMasterSp="0" type="title" preserve="1">
   <p:cSld name="Title Slide">
     <p:spTree>
       <p:nvGrpSpPr>
@@ -790,7 +790,7 @@
 </file>
 
 <file path=ppt/slideLayouts/slideLayout10.xml><?xml version="1.0" encoding="utf-8"?>
-<p:sldLayout xmlns:a="http://schemas.openxmlformats.org/drawingml/2006/main" xmlns:r="http://schemas.openxmlformats.org/officeDocument/2006/relationships" xmlns:p="http://schemas.openxmlformats.org/presentationml/2006/main" type="vertTx" preserve="1">
+<p:sldLayout xmlns:a="http://schemas.openxmlformats.org/drawingml/2006/main" xmlns:r="http://schemas.openxmlformats.org/officeDocument/2006/relationships" xmlns:mc="http://schemas.openxmlformats.org/markup-compatibility/2006" xmlns:mv="urn:schemas-microsoft-com:mac:vml" xmlns:p="http://schemas.openxmlformats.org/presentationml/2006/main" mc:Ignorable="mv" mc:PreserveAttributes="mv:*" type="vertTx" preserve="1">
   <p:cSld name="Title and Vertical Text">
     <p:spTree>
       <p:nvGrpSpPr>
@@ -926,7 +926,7 @@
 </file>
 
 <file path=ppt/slideLayouts/slideLayout11.xml><?xml version="1.0" encoding="utf-8"?>
-<p:sldLayout xmlns:a="http://schemas.openxmlformats.org/drawingml/2006/main" xmlns:r="http://schemas.openxmlformats.org/officeDocument/2006/relationships" xmlns:p="http://schemas.openxmlformats.org/presentationml/2006/main" type="vertTitleAndTx" preserve="1">
+<p:sldLayout xmlns:a="http://schemas.openxmlformats.org/drawingml/2006/main" xmlns:r="http://schemas.openxmlformats.org/officeDocument/2006/relationships" xmlns:mc="http://schemas.openxmlformats.org/markup-compatibility/2006" xmlns:mv="urn:schemas-microsoft-com:mac:vml" xmlns:p="http://schemas.openxmlformats.org/presentationml/2006/main" mc:Ignorable="mv" mc:PreserveAttributes="mv:*" type="vertTitleAndTx" preserve="1">
   <p:cSld name="Vertical Title and Text">
     <p:spTree>
       <p:nvGrpSpPr>
@@ -1072,7 +1072,7 @@
 </file>
 
 <file path=ppt/slideLayouts/slideLayout2.xml><?xml version="1.0" encoding="utf-8"?>
-<p:sldLayout xmlns:a="http://schemas.openxmlformats.org/drawingml/2006/main" xmlns:r="http://schemas.openxmlformats.org/officeDocument/2006/relationships" xmlns:p="http://schemas.openxmlformats.org/presentationml/2006/main" type="obj" preserve="1">
+<p:sldLayout xmlns:a="http://schemas.openxmlformats.org/drawingml/2006/main" xmlns:r="http://schemas.openxmlformats.org/officeDocument/2006/relationships" xmlns:mc="http://schemas.openxmlformats.org/markup-compatibility/2006" xmlns:mv="urn:schemas-microsoft-com:mac:vml" xmlns:p="http://schemas.openxmlformats.org/presentationml/2006/main" mc:Ignorable="mv" mc:PreserveAttributes="mv:*" type="obj" preserve="1">
   <p:cSld name="Title and Content">
     <p:spTree>
       <p:nvGrpSpPr>
@@ -1208,7 +1208,7 @@
 </file>
 
 <file path=ppt/slideLayouts/slideLayout3.xml><?xml version="1.0" encoding="utf-8"?>
-<p:sldLayout xmlns:a="http://schemas.openxmlformats.org/drawingml/2006/main" xmlns:r="http://schemas.openxmlformats.org/officeDocument/2006/relationships" xmlns:p="http://schemas.openxmlformats.org/presentationml/2006/main" type="secHead" preserve="1">
+<p:sldLayout xmlns:a="http://schemas.openxmlformats.org/drawingml/2006/main" xmlns:r="http://schemas.openxmlformats.org/officeDocument/2006/relationships" xmlns:mc="http://schemas.openxmlformats.org/markup-compatibility/2006" xmlns:mv="urn:schemas-microsoft-com:mac:vml" xmlns:p="http://schemas.openxmlformats.org/presentationml/2006/main" mc:Ignorable="mv" mc:PreserveAttributes="mv:*" type="secHead" preserve="1">
   <p:cSld name="Section Header">
     <p:spTree>
       <p:nvGrpSpPr>
@@ -1366,7 +1366,7 @@
 </file>
 
 <file path=ppt/slideLayouts/slideLayout4.xml><?xml version="1.0" encoding="utf-8"?>
-<p:sldLayout xmlns:a="http://schemas.openxmlformats.org/drawingml/2006/main" xmlns:r="http://schemas.openxmlformats.org/officeDocument/2006/relationships" xmlns:p="http://schemas.openxmlformats.org/presentationml/2006/main" type="twoObj" preserve="1">
+<p:sldLayout xmlns:a="http://schemas.openxmlformats.org/drawingml/2006/main" xmlns:r="http://schemas.openxmlformats.org/officeDocument/2006/relationships" xmlns:mc="http://schemas.openxmlformats.org/markup-compatibility/2006" xmlns:mv="urn:schemas-microsoft-com:mac:vml" xmlns:p="http://schemas.openxmlformats.org/presentationml/2006/main" mc:Ignorable="mv" mc:PreserveAttributes="mv:*" type="twoObj" preserve="1">
   <p:cSld name="Two Content">
     <p:spTree>
       <p:nvGrpSpPr>
@@ -1620,7 +1620,7 @@
 </file>
 
 <file path=ppt/slideLayouts/slideLayout5.xml><?xml version="1.0" encoding="utf-8"?>
-<p:sldLayout xmlns:a="http://schemas.openxmlformats.org/drawingml/2006/main" xmlns:r="http://schemas.openxmlformats.org/officeDocument/2006/relationships" xmlns:p="http://schemas.openxmlformats.org/presentationml/2006/main" type="twoTxTwoObj" preserve="1">
+<p:sldLayout xmlns:a="http://schemas.openxmlformats.org/drawingml/2006/main" xmlns:r="http://schemas.openxmlformats.org/officeDocument/2006/relationships" xmlns:mc="http://schemas.openxmlformats.org/markup-compatibility/2006" xmlns:mv="urn:schemas-microsoft-com:mac:vml" xmlns:p="http://schemas.openxmlformats.org/presentationml/2006/main" mc:Ignorable="mv" mc:PreserveAttributes="mv:*" type="twoTxTwoObj" preserve="1">
   <p:cSld name="Comparison">
     <p:spTree>
       <p:nvGrpSpPr>
@@ -2013,7 +2013,7 @@
 </file>
 
 <file path=ppt/slideLayouts/slideLayout6.xml><?xml version="1.0" encoding="utf-8"?>
-<p:sldLayout xmlns:a="http://schemas.openxmlformats.org/drawingml/2006/main" xmlns:r="http://schemas.openxmlformats.org/officeDocument/2006/relationships" xmlns:p="http://schemas.openxmlformats.org/presentationml/2006/main" type="titleOnly" preserve="1">
+<p:sldLayout xmlns:a="http://schemas.openxmlformats.org/drawingml/2006/main" xmlns:r="http://schemas.openxmlformats.org/officeDocument/2006/relationships" xmlns:mc="http://schemas.openxmlformats.org/markup-compatibility/2006" xmlns:mv="urn:schemas-microsoft-com:mac:vml" xmlns:p="http://schemas.openxmlformats.org/presentationml/2006/main" mc:Ignorable="mv" mc:PreserveAttributes="mv:*" type="titleOnly" preserve="1">
   <p:cSld name="Title Only">
     <p:spTree>
       <p:nvGrpSpPr>
@@ -2097,7 +2097,7 @@
 </file>
 
 <file path=ppt/slideLayouts/slideLayout7.xml><?xml version="1.0" encoding="utf-8"?>
-<p:sldLayout xmlns:a="http://schemas.openxmlformats.org/drawingml/2006/main" xmlns:r="http://schemas.openxmlformats.org/officeDocument/2006/relationships" xmlns:p="http://schemas.openxmlformats.org/presentationml/2006/main" type="blank" preserve="1">
+<p:sldLayout xmlns:a="http://schemas.openxmlformats.org/drawingml/2006/main" xmlns:r="http://schemas.openxmlformats.org/officeDocument/2006/relationships" xmlns:mc="http://schemas.openxmlformats.org/markup-compatibility/2006" xmlns:mv="urn:schemas-microsoft-com:mac:vml" xmlns:p="http://schemas.openxmlformats.org/presentationml/2006/main" mc:Ignorable="mv" mc:PreserveAttributes="mv:*" type="blank" preserve="1">
   <p:cSld name="Blank">
     <p:spTree>
       <p:nvGrpSpPr>
@@ -2158,7 +2158,7 @@
 </file>
 
 <file path=ppt/slideLayouts/slideLayout8.xml><?xml version="1.0" encoding="utf-8"?>
-<p:sldLayout xmlns:a="http://schemas.openxmlformats.org/drawingml/2006/main" xmlns:r="http://schemas.openxmlformats.org/officeDocument/2006/relationships" xmlns:p="http://schemas.openxmlformats.org/presentationml/2006/main" type="objTx" preserve="1">
+<p:sldLayout xmlns:a="http://schemas.openxmlformats.org/drawingml/2006/main" xmlns:r="http://schemas.openxmlformats.org/officeDocument/2006/relationships" xmlns:mc="http://schemas.openxmlformats.org/markup-compatibility/2006" xmlns:mv="urn:schemas-microsoft-com:mac:vml" xmlns:p="http://schemas.openxmlformats.org/presentationml/2006/main" mc:Ignorable="mv" mc:PreserveAttributes="mv:*" type="objTx" preserve="1">
   <p:cSld name="Content with Caption">
     <p:spTree>
       <p:nvGrpSpPr>
@@ -2401,7 +2401,7 @@
 </file>
 
 <file path=ppt/slideLayouts/slideLayout9.xml><?xml version="1.0" encoding="utf-8"?>
-<p:sldLayout xmlns:a="http://schemas.openxmlformats.org/drawingml/2006/main" xmlns:r="http://schemas.openxmlformats.org/officeDocument/2006/relationships" xmlns:p="http://schemas.openxmlformats.org/presentationml/2006/main" type="picTx" preserve="1">
+<p:sldLayout xmlns:a="http://schemas.openxmlformats.org/drawingml/2006/main" xmlns:r="http://schemas.openxmlformats.org/officeDocument/2006/relationships" xmlns:mc="http://schemas.openxmlformats.org/markup-compatibility/2006" xmlns:mv="urn:schemas-microsoft-com:mac:vml" xmlns:p="http://schemas.openxmlformats.org/presentationml/2006/main" mc:Ignorable="mv" mc:PreserveAttributes="mv:*" type="picTx" preserve="1">
   <p:cSld name="Picture with Caption">
     <p:spTree>
       <p:nvGrpSpPr>
@@ -2624,7 +2624,7 @@
 </file>
 
 <file path=ppt/slideMasters/slideMaster1.xml><?xml version="1.0" encoding="utf-8"?>
-<p:sldMaster xmlns:a="http://schemas.openxmlformats.org/drawingml/2006/main" xmlns:r="http://schemas.openxmlformats.org/officeDocument/2006/relationships" xmlns:p="http://schemas.openxmlformats.org/presentationml/2006/main">
+<p:sldMaster xmlns:a="http://schemas.openxmlformats.org/drawingml/2006/main" xmlns:r="http://schemas.openxmlformats.org/officeDocument/2006/relationships" xmlns:mc="http://schemas.openxmlformats.org/markup-compatibility/2006" xmlns:mv="urn:schemas-microsoft-com:mac:vml" xmlns:p="http://schemas.openxmlformats.org/presentationml/2006/main" mc:Ignorable="mv" mc:PreserveAttributes="mv:*">
   <p:cSld>
     <p:bg>
       <p:bgPr>
@@ -2857,7 +2857,7 @@
           <a:blip r:embed="rId14" cstate="print">
             <a:extLst>
               <a:ext uri="{28A0092B-C50C-407E-A947-70E740481C1C}">
-                <a14:useLocalDpi xmlns:a14="http://schemas.microsoft.com/office/drawing/2010/main" val="0"/>
+                <a14:useLocalDpi xmlns:a14="http://schemas.microsoft.com/office/drawing/2010/main" xmlns:p="http://schemas.openxmlformats.org/presentationml/2006/main" xmlns:r="http://schemas.openxmlformats.org/officeDocument/2006/relationships" xmlns:a="http://schemas.openxmlformats.org/drawingml/2006/main" xmlns="" val="0"/>
               </a:ext>
             </a:extLst>
           </a:blip>
@@ -3310,7 +3310,7 @@
 </file>
 
 <file path=ppt/slides/slide1.xml><?xml version="1.0" encoding="utf-8"?>
-<p:sld xmlns:a="http://schemas.openxmlformats.org/drawingml/2006/main" xmlns:r="http://schemas.openxmlformats.org/officeDocument/2006/relationships" xmlns:p="http://schemas.openxmlformats.org/presentationml/2006/main">
+<p:sld xmlns:a="http://schemas.openxmlformats.org/drawingml/2006/main" xmlns:r="http://schemas.openxmlformats.org/officeDocument/2006/relationships" xmlns:mc="http://schemas.openxmlformats.org/markup-compatibility/2006" xmlns:mv="urn:schemas-microsoft-com:mac:vml" xmlns:p="http://schemas.openxmlformats.org/presentationml/2006/main" mc:Ignorable="mv" mc:PreserveAttributes="mv:*">
   <p:cSld>
     <p:spTree>
       <p:nvGrpSpPr>
@@ -3367,7 +3367,7 @@
         <p:spPr>
           <a:xfrm>
             <a:off x="0" y="1238867"/>
-            <a:ext cx="6858000" cy="477054"/>
+            <a:ext cx="6858000" cy="707886"/>
           </a:xfrm>
           <a:prstGeom prst="rect">
             <a:avLst/>
@@ -3380,43 +3380,118 @@
           <a:lstStyle/>
           <a:p>
             <a:r>
-              <a:rPr lang="en-US" sz="1300" dirty="0" smtClean="0">
-                <a:latin typeface="Lucida Grande"/>
-                <a:cs typeface="Lucida Grande"/>
-              </a:rPr>
-              <a:t>Research </a:t>
-            </a:r>
-            <a:r>
-              <a:rPr lang="en-US" sz="1300" dirty="0">
+              <a:rPr lang="en-US" sz="800" dirty="0" smtClean="0">
+                <a:latin typeface="Lucida Grande"/>
+                <a:cs typeface="Lucida Grande"/>
+              </a:rPr>
+              <a:t>The Research </a:t>
+            </a:r>
+            <a:r>
+              <a:rPr lang="en-US" sz="800" dirty="0">
                 <a:latin typeface="Lucida Grande"/>
                 <a:cs typeface="Lucida Grande"/>
               </a:rPr>
               <a:t>in Advanced Distributed </a:t>
             </a:r>
             <a:r>
-              <a:rPr lang="en-US" sz="1300" dirty="0" err="1">
+              <a:rPr lang="en-US" sz="800" dirty="0" err="1">
                 <a:latin typeface="Lucida Grande"/>
                 <a:cs typeface="Lucida Grande"/>
               </a:rPr>
               <a:t>Cyberinfrastructure</a:t>
             </a:r>
             <a:r>
-              <a:rPr lang="en-US" sz="1300" dirty="0">
+              <a:rPr lang="en-US" sz="800" dirty="0">
                 <a:latin typeface="Lucida Grande"/>
                 <a:cs typeface="Lucida Grande"/>
               </a:rPr>
               <a:t> and Applications </a:t>
             </a:r>
             <a:r>
-              <a:rPr lang="en-US" sz="1300" dirty="0" smtClean="0">
-                <a:latin typeface="Lucida Grande"/>
-                <a:cs typeface="Lucida Grande"/>
-              </a:rPr>
-              <a:t>Laboratory</a:t>
-            </a:r>
-          </a:p>
-          <a:p>
-            <a:endParaRPr lang="en-US" sz="1200" dirty="0">
+              <a:rPr lang="en-US" sz="800" dirty="0" smtClean="0">
+                <a:latin typeface="Lucida Grande"/>
+                <a:cs typeface="Lucida Grande"/>
+              </a:rPr>
+              <a:t>Laboratory (</a:t>
+            </a:r>
+            <a:r>
+              <a:rPr lang="en-US" sz="800" dirty="0" smtClean="0">
+                <a:latin typeface="Lucida Grande"/>
+                <a:cs typeface="Lucida Grande"/>
+              </a:rPr>
+              <a:t>RADICAL) is involved in enhancing the theory and  advancing the practice of of Distributed </a:t>
+            </a:r>
+            <a:r>
+              <a:rPr lang="en-US" sz="800" dirty="0" err="1" smtClean="0">
+                <a:latin typeface="Lucida Grande"/>
+                <a:cs typeface="Lucida Grande"/>
+              </a:rPr>
+              <a:t>Cyberinfrastructure</a:t>
+            </a:r>
+            <a:r>
+              <a:rPr lang="en-US" sz="800" dirty="0" smtClean="0">
+                <a:latin typeface="Lucida Grande"/>
+                <a:cs typeface="Lucida Grande"/>
+              </a:rPr>
+              <a:t>, whilst providing scalable </a:t>
+            </a:r>
+            <a:r>
+              <a:rPr lang="en-US" sz="800" dirty="0" err="1" smtClean="0">
+                <a:latin typeface="Lucida Grande"/>
+                <a:cs typeface="Lucida Grande"/>
+              </a:rPr>
+              <a:t>cybertools</a:t>
+            </a:r>
+            <a:r>
+              <a:rPr lang="en-US" sz="800" dirty="0" smtClean="0">
+                <a:latin typeface="Lucida Grande"/>
+                <a:cs typeface="Lucida Grande"/>
+              </a:rPr>
+              <a:t> for computation and data-enabled science. Visit us at </a:t>
+            </a:r>
+            <a:r>
+              <a:rPr lang="en-US" sz="800" dirty="0" smtClean="0">
+                <a:latin typeface="Lucida Grande"/>
+                <a:cs typeface="Lucida Grande"/>
+                <a:hlinkClick r:id="rId2"/>
+              </a:rPr>
+              <a:t>http://radical.rutgers.edu/projects</a:t>
+            </a:r>
+            <a:r>
+              <a:rPr lang="en-US" sz="800" dirty="0" smtClean="0">
+                <a:latin typeface="Lucida Grande"/>
+                <a:cs typeface="Lucida Grande"/>
+              </a:rPr>
+              <a:t> for more information and see us </a:t>
+            </a:r>
+            <a:r>
+              <a:rPr lang="en-US" sz="800" dirty="0" err="1" smtClean="0">
+                <a:latin typeface="Lucida Grande"/>
+                <a:cs typeface="Lucida Grande"/>
+              </a:rPr>
+              <a:t>at</a:t>
+            </a:r>
+            <a:r>
+              <a:rPr lang="en-US" sz="800" dirty="0" err="1" smtClean="0">
+                <a:latin typeface="Lucida Grande"/>
+                <a:cs typeface="Lucida Grande"/>
+                <a:hlinkClick r:id="rId3"/>
+              </a:rPr>
+              <a:t>http://radical.rutgers.edu/people</a:t>
+            </a:r>
+            <a:endParaRPr lang="en-US" sz="800" dirty="0" smtClean="0">
+              <a:latin typeface="Lucida Grande"/>
+              <a:cs typeface="Lucida Grande"/>
+            </a:endParaRPr>
+          </a:p>
+          <a:p>
+            <a:endParaRPr lang="en-US" sz="800" dirty="0" smtClean="0">
+              <a:latin typeface="Lucida Grande"/>
+              <a:cs typeface="Lucida Grande"/>
+            </a:endParaRPr>
+          </a:p>
+          <a:p>
+            <a:endParaRPr lang="en-US" sz="800" dirty="0">
               <a:latin typeface="Lucida Grande"/>
               <a:cs typeface="Lucida Grande"/>
             </a:endParaRPr>
@@ -3480,36 +3555,6 @@
           </a:p>
         </p:txBody>
       </p:sp>
-      <p:cxnSp>
-        <p:nvCxnSpPr>
-          <p:cNvPr id="15" name="Straight Connector 14"/>
-          <p:cNvCxnSpPr/>
-          <p:nvPr/>
-        </p:nvCxnSpPr>
-        <p:spPr>
-          <a:xfrm>
-            <a:off x="0" y="1558024"/>
-            <a:ext cx="6858000" cy="0"/>
-          </a:xfrm>
-          <a:prstGeom prst="line">
-            <a:avLst/>
-          </a:prstGeom>
-        </p:spPr>
-        <p:style>
-          <a:lnRef idx="2">
-            <a:schemeClr val="accent3"/>
-          </a:lnRef>
-          <a:fillRef idx="0">
-            <a:schemeClr val="accent3"/>
-          </a:fillRef>
-          <a:effectRef idx="1">
-            <a:schemeClr val="accent3"/>
-          </a:effectRef>
-          <a:fontRef idx="minor">
-            <a:schemeClr val="tx1"/>
-          </a:fontRef>
-        </p:style>
-      </p:cxnSp>
       <p:cxnSp>
         <p:nvCxnSpPr>
           <p:cNvPr id="30" name="Straight Connector 29"/>
@@ -3609,7 +3654,7 @@
         <p:spPr>
           <a:xfrm>
             <a:off x="0" y="1652924"/>
-            <a:ext cx="3325702" cy="523220"/>
+            <a:ext cx="3325702" cy="276999"/>
           </a:xfrm>
           <a:prstGeom prst="rect">
             <a:avLst/>
@@ -3623,22 +3668,27 @@
           <a:lstStyle/>
           <a:p>
             <a:r>
-              <a:rPr lang="en-US" sz="1400" b="1" dirty="0" smtClean="0">
-                <a:latin typeface="Lucida Grande"/>
-                <a:cs typeface="Lucida Grande"/>
-              </a:rPr>
-              <a:t>SAGA: </a:t>
-            </a:r>
-          </a:p>
-          <a:p>
-            <a:r>
-              <a:rPr lang="en-US" sz="1400" b="1" dirty="0" smtClean="0">
-                <a:latin typeface="Lucida Grande"/>
-                <a:cs typeface="Lucida Grande"/>
-              </a:rPr>
-              <a:t>Simple API for Grid Applications</a:t>
-            </a:r>
-            <a:endParaRPr lang="en-US" sz="1400" b="1" dirty="0">
+              <a:rPr lang="en-US" sz="1200" b="1" dirty="0" smtClean="0">
+                <a:latin typeface="Lucida Grande"/>
+                <a:cs typeface="Lucida Grande"/>
+              </a:rPr>
+              <a:t>SAGA:</a:t>
+            </a:r>
+            <a:r>
+              <a:rPr lang="en-US" sz="1200" b="1" dirty="0" smtClean="0">
+                <a:latin typeface="Lucida Grande"/>
+                <a:cs typeface="Lucida Grande"/>
+              </a:rPr>
+              <a:t> Simple </a:t>
+            </a:r>
+            <a:r>
+              <a:rPr lang="en-US" sz="1200" b="1" dirty="0" smtClean="0">
+                <a:latin typeface="Lucida Grande"/>
+                <a:cs typeface="Lucida Grande"/>
+              </a:rPr>
+              <a:t>API for Grid Applications</a:t>
+            </a:r>
+            <a:endParaRPr lang="en-US" sz="1200" b="1" dirty="0">
               <a:latin typeface="Lucida Grande"/>
               <a:cs typeface="Lucida Grande"/>
             </a:endParaRPr>
@@ -3654,7 +3704,7 @@
         <p:spPr>
           <a:xfrm>
             <a:off x="3532298" y="1649820"/>
-            <a:ext cx="3325702" cy="307777"/>
+            <a:ext cx="3325702" cy="276999"/>
           </a:xfrm>
           <a:prstGeom prst="rect">
             <a:avLst/>
@@ -3668,20 +3718,20 @@
           <a:lstStyle/>
           <a:p>
             <a:r>
-              <a:rPr lang="en-US" sz="1400" b="1" dirty="0" err="1" smtClean="0">
+              <a:rPr lang="en-US" sz="1200" b="1" dirty="0" err="1" smtClean="0">
                 <a:latin typeface="Lucida Grande"/>
                 <a:cs typeface="Lucida Grande"/>
               </a:rPr>
               <a:t>Cyberinfrastructure</a:t>
             </a:r>
             <a:r>
-              <a:rPr lang="en-US" sz="1400" b="1" dirty="0" smtClean="0">
+              <a:rPr lang="en-US" sz="1200" b="1" dirty="0" smtClean="0">
                 <a:latin typeface="Lucida Grande"/>
                 <a:cs typeface="Lucida Grande"/>
               </a:rPr>
               <a:t> Projects</a:t>
             </a:r>
-            <a:endParaRPr lang="en-US" sz="1400" b="1" dirty="0">
+            <a:endParaRPr lang="en-US" sz="1200" b="1" dirty="0">
               <a:latin typeface="Lucida Grande"/>
               <a:cs typeface="Lucida Grande"/>
             </a:endParaRPr>
@@ -3697,7 +3747,7 @@
         <p:spPr>
           <a:xfrm>
             <a:off x="0" y="5715658"/>
-            <a:ext cx="3325702" cy="307777"/>
+            <a:ext cx="3325702" cy="276999"/>
           </a:xfrm>
           <a:prstGeom prst="rect">
             <a:avLst/>
@@ -3711,13 +3761,13 @@
           <a:lstStyle/>
           <a:p>
             <a:r>
-              <a:rPr lang="en-US" sz="1400" b="1" dirty="0" smtClean="0">
+              <a:rPr lang="en-US" sz="1200" b="1" dirty="0" smtClean="0">
                 <a:latin typeface="Lucida Grande"/>
                 <a:cs typeface="Lucida Grande"/>
               </a:rPr>
               <a:t>P*: A Model for Pilot Abstractions</a:t>
             </a:r>
-            <a:endParaRPr lang="en-US" sz="1400" b="1" dirty="0">
+            <a:endParaRPr lang="en-US" sz="1200" b="1" dirty="0">
               <a:latin typeface="Lucida Grande"/>
               <a:cs typeface="Lucida Grande"/>
             </a:endParaRPr>
@@ -3733,7 +3783,7 @@
         <p:spPr>
           <a:xfrm>
             <a:off x="3532298" y="1998034"/>
-            <a:ext cx="3325702" cy="3447098"/>
+            <a:ext cx="3325702" cy="3693320"/>
           </a:xfrm>
           <a:prstGeom prst="rect">
             <a:avLst/>
@@ -3746,6 +3796,241 @@
           </a:bodyPr>
           <a:lstStyle/>
           <a:p>
+            <a:r>
+              <a:rPr lang="en-US" sz="800" b="1" dirty="0" smtClean="0">
+                <a:latin typeface="Lucida Grande"/>
+                <a:cs typeface="Lucida Grande"/>
+              </a:rPr>
+              <a:t>I. Extending </a:t>
+            </a:r>
+            <a:r>
+              <a:rPr lang="en-US" sz="800" b="1" dirty="0" smtClean="0">
+                <a:latin typeface="Lucida Grande"/>
+                <a:cs typeface="Lucida Grande"/>
+              </a:rPr>
+              <a:t>National </a:t>
+            </a:r>
+            <a:r>
+              <a:rPr lang="en-US" sz="800" b="1" dirty="0" err="1" smtClean="0">
+                <a:latin typeface="Lucida Grande"/>
+                <a:cs typeface="Lucida Grande"/>
+              </a:rPr>
+              <a:t>Cyberinfrastructure(</a:t>
+            </a:r>
+            <a:r>
+              <a:rPr lang="en-US" sz="800" b="1" dirty="0" err="1" smtClean="0">
+                <a:latin typeface="Lucida Grande"/>
+                <a:cs typeface="Lucida Grande"/>
+              </a:rPr>
+              <a:t>ExTENCI</a:t>
+            </a:r>
+            <a:r>
+              <a:rPr lang="en-US" sz="800" b="1" dirty="0" smtClean="0">
+                <a:latin typeface="Lucida Grande"/>
+                <a:cs typeface="Lucida Grande"/>
+              </a:rPr>
+              <a:t>): </a:t>
+            </a:r>
+            <a:r>
+              <a:rPr lang="en-US" sz="800" dirty="0" smtClean="0">
+                <a:latin typeface="Lucida Grande"/>
+                <a:cs typeface="Lucida Grande"/>
+              </a:rPr>
+              <a:t>The </a:t>
+            </a:r>
+            <a:r>
+              <a:rPr lang="en-US" sz="800" dirty="0" err="1" smtClean="0">
+                <a:latin typeface="Lucida Grande"/>
+                <a:cs typeface="Lucida Grande"/>
+              </a:rPr>
+              <a:t>ExTENCI</a:t>
+            </a:r>
+            <a:r>
+              <a:rPr lang="en-US" sz="800" dirty="0" smtClean="0">
+                <a:latin typeface="Lucida Grande"/>
+                <a:cs typeface="Lucida Grande"/>
+              </a:rPr>
+              <a:t> project aims to provide </a:t>
+            </a:r>
+            <a:r>
+              <a:rPr lang="en-US" sz="800" dirty="0" err="1" smtClean="0">
+                <a:latin typeface="Lucida Grande"/>
+                <a:cs typeface="Lucida Grande"/>
+              </a:rPr>
+              <a:t>interoperablity</a:t>
+            </a:r>
+            <a:r>
+              <a:rPr lang="en-US" sz="800" dirty="0" smtClean="0">
+                <a:latin typeface="Lucida Grande"/>
+                <a:cs typeface="Lucida Grande"/>
+              </a:rPr>
+              <a:t> between the nation’s production </a:t>
+            </a:r>
+            <a:r>
+              <a:rPr lang="en-US" sz="800" dirty="0" err="1" smtClean="0">
+                <a:latin typeface="Lucida Grande"/>
+                <a:cs typeface="Lucida Grande"/>
+              </a:rPr>
+              <a:t>cyberinfrastructure</a:t>
+            </a:r>
+            <a:r>
+              <a:rPr lang="en-US" sz="800" dirty="0" smtClean="0">
+                <a:latin typeface="Lucida Grande"/>
+                <a:cs typeface="Lucida Grande"/>
+              </a:rPr>
+              <a:t>.</a:t>
+            </a:r>
+            <a:r>
+              <a:rPr lang="en-US" sz="800" dirty="0" smtClean="0">
+                <a:latin typeface="Lucida Grande"/>
+                <a:cs typeface="Lucida Grande"/>
+              </a:rPr>
+              <a:t> Currently focused on </a:t>
+            </a:r>
+            <a:r>
+              <a:rPr lang="en-US" sz="800" dirty="0" err="1" smtClean="0">
+                <a:latin typeface="Lucida Grande"/>
+                <a:cs typeface="Lucida Grande"/>
+              </a:rPr>
+              <a:t>interoperabilty</a:t>
+            </a:r>
+            <a:r>
+              <a:rPr lang="en-US" sz="800" dirty="0" smtClean="0">
+                <a:latin typeface="Lucida Grande"/>
+                <a:cs typeface="Lucida Grande"/>
+              </a:rPr>
+              <a:t> between XSEDE and OSG, RADICAL is supporting the use of SAGA and </a:t>
+            </a:r>
+            <a:r>
+              <a:rPr lang="en-US" sz="800" dirty="0" err="1" smtClean="0">
+                <a:latin typeface="Lucida Grande"/>
+                <a:cs typeface="Lucida Grande"/>
+              </a:rPr>
+              <a:t>BigJob</a:t>
+            </a:r>
+            <a:r>
+              <a:rPr lang="en-US" sz="800" dirty="0" smtClean="0">
+                <a:latin typeface="Lucida Grande"/>
+                <a:cs typeface="Lucida Grande"/>
+              </a:rPr>
+              <a:t> to advance data-intensive applications such as next-generation gene sequencing, as well as high-performance high-throughput applications.</a:t>
+            </a:r>
+            <a:endParaRPr lang="en-US" sz="800" b="1" dirty="0" smtClean="0">
+              <a:latin typeface="Lucida Grande"/>
+              <a:cs typeface="Lucida Grande"/>
+            </a:endParaRPr>
+          </a:p>
+          <a:p>
+            <a:endParaRPr lang="en-US" sz="800" b="1" dirty="0" smtClean="0">
+              <a:latin typeface="Lucida Grande"/>
+              <a:cs typeface="Lucida Grande"/>
+            </a:endParaRPr>
+          </a:p>
+          <a:p>
+            <a:r>
+              <a:rPr lang="en-US" sz="800" b="1" dirty="0" smtClean="0">
+                <a:latin typeface="Lucida Grande"/>
+                <a:cs typeface="Lucida Grande"/>
+              </a:rPr>
+              <a:t>II</a:t>
+            </a:r>
+            <a:r>
+              <a:rPr lang="en-US" sz="800" b="1" dirty="0" smtClean="0">
+                <a:latin typeface="Lucida Grande"/>
+                <a:cs typeface="Lucida Grande"/>
+              </a:rPr>
+              <a:t>. Standards</a:t>
+            </a:r>
+            <a:r>
+              <a:rPr lang="en-US" sz="800" b="1" dirty="0">
+                <a:latin typeface="Lucida Grande"/>
+                <a:cs typeface="Lucida Grande"/>
+              </a:rPr>
+              <a:t>-based </a:t>
+            </a:r>
+            <a:r>
+              <a:rPr lang="en-US" sz="800" b="1" dirty="0" err="1">
+                <a:latin typeface="Lucida Grande"/>
+                <a:cs typeface="Lucida Grande"/>
+              </a:rPr>
+              <a:t>Cyberinfrastructure</a:t>
+            </a:r>
+            <a:r>
+              <a:rPr lang="en-US" sz="800" b="1" dirty="0">
+                <a:latin typeface="Lucida Grande"/>
+                <a:cs typeface="Lucida Grande"/>
+              </a:rPr>
+              <a:t> for </a:t>
+            </a:r>
+            <a:r>
+              <a:rPr lang="en-US" sz="800" b="1" dirty="0" err="1">
+                <a:latin typeface="Lucida Grande"/>
+                <a:cs typeface="Lucida Grande"/>
+              </a:rPr>
+              <a:t>Hydrometrogical</a:t>
+            </a:r>
+            <a:r>
+              <a:rPr lang="en-US" sz="800" b="1" dirty="0">
+                <a:latin typeface="Lucida Grande"/>
+                <a:cs typeface="Lucida Grande"/>
+              </a:rPr>
+              <a:t> </a:t>
+            </a:r>
+            <a:r>
+              <a:rPr lang="en-US" sz="800" b="1" dirty="0" smtClean="0">
+                <a:latin typeface="Lucida Grande"/>
+                <a:cs typeface="Lucida Grande"/>
+              </a:rPr>
+              <a:t>Modeling (SCHIM</a:t>
+            </a:r>
+            <a:r>
+              <a:rPr lang="en-US" sz="800" b="1" dirty="0" smtClean="0">
+                <a:latin typeface="Lucida Grande"/>
+                <a:cs typeface="Lucida Grande"/>
+              </a:rPr>
+              <a:t>): </a:t>
+            </a:r>
+            <a:r>
+              <a:rPr lang="en-US" sz="800" dirty="0" smtClean="0">
+                <a:latin typeface="Lucida Grande"/>
+                <a:cs typeface="Lucida Grande"/>
+              </a:rPr>
+              <a:t>I</a:t>
+            </a:r>
+            <a:r>
+              <a:rPr lang="en-US" sz="800" dirty="0" smtClean="0">
+                <a:latin typeface="Lucida Grande"/>
+                <a:cs typeface="Lucida Grande"/>
+              </a:rPr>
+              <a:t>n collaboration with US and European partners, </a:t>
+            </a:r>
+            <a:r>
+              <a:rPr lang="en-US" sz="800" dirty="0" smtClean="0">
+                <a:latin typeface="Lucida Grande"/>
+                <a:cs typeface="Lucida Grande"/>
+              </a:rPr>
+              <a:t>RADICAL is enabling climate modeling scientists to utilize interoperable, extensible and standards-based capabilities. RADICAL is enabling the coupling of advanced data-infrastructure (</a:t>
+            </a:r>
+            <a:r>
+              <a:rPr lang="en-US" sz="800" dirty="0" err="1" smtClean="0">
+                <a:latin typeface="Lucida Grande"/>
+                <a:cs typeface="Lucida Grande"/>
+              </a:rPr>
+              <a:t>iRODS</a:t>
+            </a:r>
+            <a:r>
+              <a:rPr lang="en-US" sz="800" dirty="0" smtClean="0">
+                <a:latin typeface="Lucida Grande"/>
+                <a:cs typeface="Lucida Grande"/>
+              </a:rPr>
+              <a:t>) with high-performance infrastructure such as XSEDE and PRACE. </a:t>
+            </a:r>
+            <a:endParaRPr lang="en-US" sz="800" b="1" dirty="0" smtClean="0">
+              <a:latin typeface="Lucida Grande"/>
+              <a:cs typeface="Lucida Grande"/>
+            </a:endParaRPr>
+          </a:p>
+          <a:p>
             <a:endParaRPr lang="en-US" sz="1000" b="1" dirty="0" smtClean="0">
               <a:latin typeface="Lucida Grande"/>
               <a:cs typeface="Lucida Grande"/>
@@ -3753,173 +4038,74 @@
           </a:p>
           <a:p>
             <a:r>
-              <a:rPr lang="en-US" sz="1000" b="1" dirty="0" smtClean="0">
-                <a:latin typeface="Lucida Grande"/>
-                <a:cs typeface="Lucida Grande"/>
-              </a:rPr>
-              <a:t>I. Extending National </a:t>
-            </a:r>
-            <a:r>
-              <a:rPr lang="en-US" sz="1000" b="1" dirty="0" err="1" smtClean="0">
+              <a:rPr lang="en-US" sz="800" b="1" dirty="0" smtClean="0">
+                <a:latin typeface="Lucida Grande"/>
+                <a:cs typeface="Lucida Grande"/>
+              </a:rPr>
+              <a:t>III</a:t>
+            </a:r>
+            <a:r>
+              <a:rPr lang="en-US" sz="800" b="1" dirty="0" smtClean="0">
+                <a:latin typeface="Lucida Grande"/>
+                <a:cs typeface="Lucida Grande"/>
+              </a:rPr>
+              <a:t>.</a:t>
+            </a:r>
+            <a:r>
+              <a:rPr lang="en-US" sz="800" b="1" dirty="0" smtClean="0">
+                <a:latin typeface="Lucida Grande"/>
+                <a:cs typeface="Lucida Grande"/>
+              </a:rPr>
+              <a:t> </a:t>
+            </a:r>
+            <a:r>
+              <a:rPr lang="en-US" sz="800" b="1" dirty="0" smtClean="0">
+                <a:latin typeface="Lucida Grande"/>
+                <a:cs typeface="Lucida Grande"/>
+              </a:rPr>
+              <a:t>NSF-CDI: </a:t>
+            </a:r>
+            <a:r>
+              <a:rPr lang="en-US" sz="800" b="1" dirty="0" smtClean="0">
+                <a:latin typeface="Lucida Grande"/>
+                <a:cs typeface="Lucida Grande"/>
+              </a:rPr>
+              <a:t>Large</a:t>
+            </a:r>
+            <a:r>
+              <a:rPr lang="en-US" sz="800" b="1" dirty="0">
+                <a:latin typeface="Lucida Grande"/>
+                <a:cs typeface="Lucida Grande"/>
+              </a:rPr>
+              <a:t>-Scale Replica-Exchange on National Production </a:t>
+            </a:r>
+            <a:r>
+              <a:rPr lang="en-US" sz="800" b="1" dirty="0" err="1" smtClean="0">
                 <a:latin typeface="Lucida Grande"/>
                 <a:cs typeface="Lucida Grande"/>
               </a:rPr>
               <a:t>Cyberinfrastructure</a:t>
             </a:r>
             <a:r>
-              <a:rPr lang="en-US" sz="1000" b="1" dirty="0">
-                <a:latin typeface="Lucida Grande"/>
-                <a:cs typeface="Lucida Grande"/>
-              </a:rPr>
-              <a:t> </a:t>
-            </a:r>
-            <a:r>
-              <a:rPr lang="en-US" sz="1000" b="1" dirty="0" smtClean="0">
-                <a:latin typeface="Lucida Grande"/>
-                <a:cs typeface="Lucida Grande"/>
-              </a:rPr>
-              <a:t>(</a:t>
-            </a:r>
-            <a:r>
-              <a:rPr lang="en-US" sz="1000" b="1" dirty="0" err="1" smtClean="0">
-                <a:latin typeface="Lucida Grande"/>
-                <a:cs typeface="Lucida Grande"/>
-              </a:rPr>
-              <a:t>ExTENCI</a:t>
-            </a:r>
-            <a:r>
-              <a:rPr lang="en-US" sz="1000" b="1" dirty="0" smtClean="0">
-                <a:latin typeface="Lucida Grande"/>
-                <a:cs typeface="Lucida Grande"/>
-              </a:rPr>
-              <a:t>)</a:t>
-            </a:r>
-          </a:p>
-          <a:p>
-            <a:endParaRPr lang="en-US" sz="1000" b="1" dirty="0" smtClean="0">
-              <a:latin typeface="Lucida Grande"/>
-              <a:cs typeface="Lucida Grande"/>
-            </a:endParaRPr>
-          </a:p>
-          <a:p>
-            <a:endParaRPr lang="en-US" sz="1000" b="1" dirty="0">
-              <a:latin typeface="Lucida Grande"/>
-              <a:cs typeface="Lucida Grande"/>
-            </a:endParaRPr>
-          </a:p>
-          <a:p>
-            <a:endParaRPr lang="en-US" sz="1000" b="1" dirty="0" smtClean="0">
-              <a:latin typeface="Lucida Grande"/>
-              <a:cs typeface="Lucida Grande"/>
-            </a:endParaRPr>
-          </a:p>
-          <a:p>
-            <a:r>
-              <a:rPr lang="en-US" sz="1000" b="1" dirty="0" smtClean="0">
-                <a:latin typeface="Lucida Grande"/>
-                <a:cs typeface="Lucida Grande"/>
-              </a:rPr>
-              <a:t>II. Standards</a:t>
-            </a:r>
-            <a:r>
-              <a:rPr lang="en-US" sz="1000" b="1" dirty="0">
-                <a:latin typeface="Lucida Grande"/>
-                <a:cs typeface="Lucida Grande"/>
-              </a:rPr>
-              <a:t>-based </a:t>
-            </a:r>
-            <a:r>
-              <a:rPr lang="en-US" sz="1000" b="1" dirty="0" err="1">
-                <a:latin typeface="Lucida Grande"/>
-                <a:cs typeface="Lucida Grande"/>
-              </a:rPr>
-              <a:t>Cyberinfrastructure</a:t>
-            </a:r>
-            <a:r>
-              <a:rPr lang="en-US" sz="1000" b="1" dirty="0">
-                <a:latin typeface="Lucida Grande"/>
-                <a:cs typeface="Lucida Grande"/>
-              </a:rPr>
-              <a:t> for </a:t>
-            </a:r>
-            <a:r>
-              <a:rPr lang="en-US" sz="1000" b="1" dirty="0" err="1">
-                <a:latin typeface="Lucida Grande"/>
-                <a:cs typeface="Lucida Grande"/>
-              </a:rPr>
-              <a:t>Hydrometrogical</a:t>
-            </a:r>
-            <a:r>
-              <a:rPr lang="en-US" sz="1000" b="1" dirty="0">
-                <a:latin typeface="Lucida Grande"/>
-                <a:cs typeface="Lucida Grande"/>
-              </a:rPr>
-              <a:t> </a:t>
-            </a:r>
-            <a:r>
-              <a:rPr lang="en-US" sz="1000" b="1" dirty="0" smtClean="0">
-                <a:latin typeface="Lucida Grande"/>
-                <a:cs typeface="Lucida Grande"/>
-              </a:rPr>
-              <a:t>Modeling (SCHIM)</a:t>
-            </a:r>
-          </a:p>
-          <a:p>
-            <a:endParaRPr lang="en-US" sz="1000" b="1" dirty="0" smtClean="0">
-              <a:latin typeface="Lucida Grande"/>
-              <a:cs typeface="Lucida Grande"/>
-            </a:endParaRPr>
-          </a:p>
-          <a:p>
-            <a:endParaRPr lang="en-US" sz="1000" b="1" dirty="0" smtClean="0">
-              <a:latin typeface="Lucida Grande"/>
-              <a:cs typeface="Lucida Grande"/>
-            </a:endParaRPr>
-          </a:p>
-          <a:p>
-            <a:r>
-              <a:rPr lang="en-US" sz="1000" b="1" dirty="0" smtClean="0">
-                <a:latin typeface="Lucida Grande"/>
-                <a:cs typeface="Lucida Grande"/>
-              </a:rPr>
-              <a:t>III. Large</a:t>
-            </a:r>
-            <a:r>
-              <a:rPr lang="en-US" sz="1000" b="1" dirty="0">
-                <a:latin typeface="Lucida Grande"/>
-                <a:cs typeface="Lucida Grande"/>
-              </a:rPr>
-              <a:t>-Scale Replica-Exchange on National Production </a:t>
-            </a:r>
-            <a:r>
-              <a:rPr lang="en-US" sz="1000" b="1" dirty="0" err="1">
-                <a:latin typeface="Lucida Grande"/>
-                <a:cs typeface="Lucida Grande"/>
-              </a:rPr>
-              <a:t>Cyberinfrastructure</a:t>
-            </a:r>
-            <a:r>
-              <a:rPr lang="en-US" sz="1000" b="1" dirty="0">
-                <a:latin typeface="Lucida Grande"/>
-                <a:cs typeface="Lucida Grande"/>
-              </a:rPr>
-              <a:t>: An NSF Cyber-enabled Discovery and Innovation (CDI) </a:t>
-            </a:r>
-            <a:r>
-              <a:rPr lang="en-US" sz="1000" b="1" dirty="0" smtClean="0">
-                <a:latin typeface="Lucida Grande"/>
-                <a:cs typeface="Lucida Grande"/>
-              </a:rPr>
-              <a:t>Project</a:t>
-            </a:r>
-          </a:p>
-          <a:p>
+              <a:rPr lang="en-US" sz="800" b="1" dirty="0" smtClean="0">
+                <a:latin typeface="Lucida Grande"/>
+                <a:cs typeface="Lucida Grande"/>
+              </a:rPr>
+              <a:t>: </a:t>
+            </a:r>
+            <a:r>
+              <a:rPr lang="en-US" sz="800" dirty="0" smtClean="0">
+                <a:latin typeface="Lucida Grande"/>
+                <a:cs typeface="Lucida Grande"/>
+              </a:rPr>
+              <a:t>SAGA </a:t>
+            </a:r>
             <a:r>
               <a:rPr lang="en-US" sz="800" dirty="0">
                 <a:latin typeface="Lucida Grande"/>
                 <a:cs typeface="Lucida Grande"/>
               </a:rPr>
-              <a:t>SAGA and SAGA-based Pilot Abstractions (such as </a:t>
+              <a:t>and SAGA-based Pilot Abstractions (such as </a:t>
             </a:r>
             <a:r>
               <a:rPr lang="en-US" sz="800" dirty="0" err="1">
@@ -3975,65 +4161,58 @@
                 <a:latin typeface="Lucida Grande"/>
                 <a:cs typeface="Lucida Grande"/>
               </a:rPr>
-              <a:t>) with differing coupling schemas. </a:t>
+              <a:t>) with differing coupling schemas. Multiple molecular dynamic engines including AMBER, NAMD, and IMPACT are supported</a:t>
+            </a:r>
+            <a:r>
+              <a:rPr lang="en-US" sz="800" dirty="0" smtClean="0">
+                <a:latin typeface="Lucida Grande"/>
+                <a:cs typeface="Lucida Grande"/>
+              </a:rPr>
+              <a:t>. Pilot</a:t>
             </a:r>
             <a:r>
               <a:rPr lang="en-US" sz="800" dirty="0">
                 <a:latin typeface="Lucida Grande"/>
                 <a:cs typeface="Lucida Grande"/>
               </a:rPr>
-              <a:t>Multiple molecular dynamic engines including AMBER, NAMD, and IMPACT are supported</a:t>
+              <a:t>-abstractions (</a:t>
+            </a:r>
+            <a:r>
+              <a:rPr lang="en-US" sz="800" dirty="0" err="1">
+                <a:latin typeface="Lucida Grande"/>
+                <a:cs typeface="Lucida Grande"/>
+              </a:rPr>
+              <a:t>i</a:t>
+            </a:r>
+            <a:r>
+              <a:rPr lang="en-US" sz="800" dirty="0">
+                <a:latin typeface="Lucida Grande"/>
+                <a:cs typeface="Lucida Grande"/>
+              </a:rPr>
+              <a:t>) help support the concurrent execution and coordination of thousands of uncoupled ensembles (each of which is an MPI-based HPC simulation</a:t>
             </a:r>
             <a:r>
               <a:rPr lang="en-US" sz="800" dirty="0" smtClean="0">
                 <a:latin typeface="Lucida Grande"/>
                 <a:cs typeface="Lucida Grande"/>
               </a:rPr>
-              <a:t>. Pilot</a:t>
+              <a:t>) and (</a:t>
             </a:r>
             <a:r>
               <a:rPr lang="en-US" sz="800" dirty="0">
                 <a:latin typeface="Lucida Grande"/>
                 <a:cs typeface="Lucida Grande"/>
               </a:rPr>
-              <a:t>-abstractions (</a:t>
-            </a:r>
-            <a:r>
-              <a:rPr lang="en-US" sz="800" dirty="0" err="1">
-                <a:latin typeface="Lucida Grande"/>
-                <a:cs typeface="Lucida Grande"/>
-              </a:rPr>
-              <a:t>i</a:t>
-            </a:r>
-            <a:r>
-              <a:rPr lang="en-US" sz="800" dirty="0">
-                <a:latin typeface="Lucida Grande"/>
-                <a:cs typeface="Lucida Grande"/>
-              </a:rPr>
-              <a:t>) help support the concurrent execution and coordination of thousands of uncoupled ensembles (each of which is an MPI-based HPC simulation</a:t>
+              <a:t>ii) provide a framework to support the execution of multiple loosely-coupled replicas</a:t>
             </a:r>
             <a:r>
               <a:rPr lang="en-US" sz="800" dirty="0" smtClean="0">
                 <a:latin typeface="Lucida Grande"/>
                 <a:cs typeface="Lucida Grande"/>
               </a:rPr>
-              <a:t>) and (</a:t>
-            </a:r>
-            <a:r>
-              <a:rPr lang="en-US" sz="800" dirty="0">
-                <a:latin typeface="Lucida Grande"/>
-                <a:cs typeface="Lucida Grande"/>
-              </a:rPr>
-              <a:t>ii) provide a framework to support the execution of multiple loosely-coupled replicas</a:t>
-            </a:r>
-            <a:r>
-              <a:rPr lang="en-US" sz="800" dirty="0" smtClean="0">
-                <a:latin typeface="Lucida Grande"/>
-                <a:cs typeface="Lucida Grande"/>
-              </a:rPr>
               <a:t>.</a:t>
             </a:r>
-            <a:endParaRPr lang="en-US" sz="1000" b="1" dirty="0">
+            <a:endParaRPr lang="en-US" sz="800" b="1" dirty="0">
               <a:latin typeface="Lucida Grande"/>
               <a:cs typeface="Lucida Grande"/>
             </a:endParaRPr>
@@ -4048,7 +4227,7 @@
         </p:nvSpPr>
         <p:spPr>
           <a:xfrm>
-            <a:off x="0" y="2140183"/>
+            <a:off x="0" y="1962383"/>
             <a:ext cx="3429000" cy="2554546"/>
           </a:xfrm>
           <a:prstGeom prst="rect">
@@ -4198,7 +4377,7 @@
         </p:nvSpPr>
         <p:spPr>
           <a:xfrm>
-            <a:off x="0" y="4624692"/>
+            <a:off x="0" y="4573890"/>
             <a:ext cx="3429000" cy="1077218"/>
           </a:xfrm>
           <a:prstGeom prst="rect">
@@ -4306,7 +4485,7 @@
               <a:rPr lang="en-US" sz="800" dirty="0">
                 <a:latin typeface="Lucida Grande"/>
                 <a:cs typeface="Lucida Grande"/>
-                <a:hlinkClick r:id="rId2"/>
+                <a:hlinkClick r:id="rId4"/>
               </a:rPr>
               <a:t>http://saga-project.github.com/bliss</a:t>
             </a:r>
@@ -4314,7 +4493,7 @@
               <a:rPr lang="en-US" sz="800" dirty="0" smtClean="0">
                 <a:latin typeface="Lucida Grande"/>
                 <a:cs typeface="Lucida Grande"/>
-                <a:hlinkClick r:id="rId2"/>
+                <a:hlinkClick r:id="rId4"/>
               </a:rPr>
               <a:t>/</a:t>
             </a:r>
@@ -4341,7 +4520,7 @@
           <p:nvPr/>
         </p:nvPicPr>
         <p:blipFill>
-          <a:blip r:embed="rId3"/>
+          <a:blip r:embed="rId5"/>
           <a:stretch>
             <a:fillRect/>
           </a:stretch>
@@ -4412,9 +4591,7 @@
           </a:bodyPr>
           <a:lstStyle/>
           <a:p>
-            <a:pPr marL="285750" indent="-285750" algn="just">
-              <a:buAutoNum type="romanUcPeriod"/>
-            </a:pPr>
+            <a:pPr marL="285750" indent="-285750" algn="just"/>
             <a:r>
               <a:rPr lang="en-US" sz="1000" b="1" dirty="0" smtClean="0">
                 <a:solidFill>
@@ -4423,7 +4600,7 @@
                 <a:latin typeface="Lucida Grande"/>
                 <a:cs typeface="Lucida Grande"/>
               </a:rPr>
-              <a:t>P</a:t>
+              <a:t>	P</a:t>
             </a:r>
             <a:r>
               <a:rPr lang="en-US" sz="1000" b="1" dirty="0" smtClean="0">
@@ -4433,27 +4610,7 @@
                 <a:latin typeface="Lucida Grande"/>
                 <a:cs typeface="Lucida Grande"/>
               </a:rPr>
-              <a:t>*</a:t>
-            </a:r>
-            <a:r>
-              <a:rPr lang="en-US" sz="1000" b="1" dirty="0" smtClean="0">
-                <a:solidFill>
-                  <a:srgbClr val="000000"/>
-                </a:solidFill>
-                <a:latin typeface="Lucida Grande"/>
-                <a:cs typeface="Lucida Grande"/>
-              </a:rPr>
-              <a:t>: </a:t>
-            </a:r>
-            <a:r>
-              <a:rPr lang="en-US" sz="1000" dirty="0" smtClean="0">
-                <a:solidFill>
-                  <a:srgbClr val="000000"/>
-                </a:solidFill>
-                <a:latin typeface="Lucida Grande"/>
-                <a:cs typeface="Lucida Grande"/>
-              </a:rPr>
-              <a:t/>
+              <a:t>*: </a:t>
             </a:r>
             <a:r>
               <a:rPr lang="en-US" sz="900" dirty="0" smtClean="0">
@@ -4730,7 +4887,7 @@
               <a:rPr lang="en-US" sz="900" dirty="0" smtClean="0">
                 <a:latin typeface="Lucida Grande"/>
                 <a:cs typeface="Lucida Grande"/>
-                <a:hlinkClick r:id="rId4"/>
+                <a:hlinkClick r:id="rId6"/>
               </a:rPr>
               <a:t>http://saga-project.github.com/BigJob</a:t>
             </a:r>
@@ -4753,16 +4910,6 @@
             <a:endParaRPr lang="en-US" sz="1000" dirty="0"/>
           </a:p>
           <a:p>
-            <a:r>
-              <a:rPr lang="en-US" sz="1000" b="1" dirty="0" smtClean="0">
-                <a:solidFill>
-                  <a:srgbClr val="000000"/>
-                </a:solidFill>
-                <a:latin typeface="Lucida Grande"/>
-                <a:cs typeface="Lucida Grande"/>
-              </a:rPr>
-              <a:t/>
-            </a:r>
             <a:endParaRPr lang="en-US" sz="1000" b="1" dirty="0" smtClean="0">
               <a:solidFill>
                 <a:srgbClr val="000000"/>
@@ -4785,7 +4932,7 @@
     </p:spTree>
     <p:extLst>
       <p:ext uri="{BB962C8B-B14F-4D97-AF65-F5344CB8AC3E}">
-        <p14:creationId xmlns:p14="http://schemas.microsoft.com/office/powerpoint/2010/main" val="3116603517"/>
+        <p14:creationId xmlns:p14="http://schemas.microsoft.com/office/powerpoint/2010/main" xmlns:p="http://schemas.openxmlformats.org/presentationml/2006/main" xmlns:r="http://schemas.openxmlformats.org/officeDocument/2006/relationships" xmlns:a="http://schemas.openxmlformats.org/drawingml/2006/main" xmlns="" val="3116603517"/>
       </p:ext>
     </p:extLst>
   </p:cSld>
@@ -4795,7 +4942,7 @@
   <p:timing>
     <p:tnLst>
       <p:par>
-        <p:cTn xmlns:p14="http://schemas.microsoft.com/office/powerpoint/2010/main" id="1" dur="indefinite" restart="never" nodeType="tmRoot"/>
+        <p:cTn id="1" dur="indefinite" restart="never" nodeType="tmRoot"/>
       </p:par>
     </p:tnLst>
   </p:timing>

</xml_diff>